<commit_message>
edits on experiment design
</commit_message>
<xml_diff>
--- a/7-Draft/wssa-23-Nov-23.pptx
+++ b/7-Draft/wssa-23-Nov-23.pptx
@@ -3388,7 +3388,7 @@
                       <a:schemeClr val="tx1"/>
                     </a:solidFill>
                   </a:rPr>
-                  <a:t>Randomized complete block design with 4 replications (N = 48). Each replication consisted of 10 brassica cover crop species, 1 red clover, and 1 bare soil treatment. Red clover and bare soil are control treatments. </a:t>
+                  <a:t>Randomized complete block design with 4 replications (N = 48). Each replication consisted of 10 brassica cover crop species, 1 red clover, and 1 no cover crop treatment. Red clover and no cover crop are control treatments. </a:t>
                 </a:r>
               </a:p>
               <a:p>
@@ -3418,7 +3418,25 @@
                       <a:schemeClr val="tx1"/>
                     </a:solidFill>
                   </a:rPr>
-                  <a:t>species and red clover were frost-seeded on March 23</a:t>
+                  <a:t>species and red clover were frost-seeded into </a:t>
+                </a:r>
+                <a:r>
+                  <a:rPr lang="en-US" sz="6000" b="0" i="0" u="none" strike="noStrike" dirty="0">
+                    <a:solidFill>
+                      <a:srgbClr val="000000"/>
+                    </a:solidFill>
+                    <a:effectLst/>
+                    <a:latin typeface="Calibri" panose="020F0502020204030204" pitchFamily="34" charset="0"/>
+                  </a:rPr>
+                  <a:t>rolled cereal rye mulch </a:t>
+                </a:r>
+                <a:r>
+                  <a:rPr lang="en-US" sz="6000" dirty="0">
+                    <a:solidFill>
+                      <a:schemeClr val="tx1"/>
+                    </a:solidFill>
+                  </a:rPr>
+                  <a:t>on March 23</a:t>
                 </a:r>
                 <a:r>
                   <a:rPr lang="en-US" sz="6000" baseline="30000" dirty="0">
@@ -3434,26 +3452,21 @@
                       <a:schemeClr val="tx1"/>
                     </a:solidFill>
                   </a:rPr>
-                  <a:t>, 2022. All the brassicas were frost-seeded into </a:t>
+                  <a:t>, 2022. The no cover crop was rolled rye </a:t>
                 </a:r>
                 <a:r>
-                  <a:rPr lang="en-US" sz="6000" b="0" i="0" u="none" strike="noStrike" dirty="0">
-                    <a:solidFill>
-                      <a:srgbClr val="000000"/>
-                    </a:solidFill>
-                    <a:effectLst/>
-                    <a:latin typeface="Calibri" panose="020F0502020204030204" pitchFamily="34" charset="0"/>
-                  </a:rPr>
-                  <a:t>rolled cereal rye mulch</a:t>
-                </a:r>
-                <a:r>
-                  <a:rPr lang="en-US" sz="6000" dirty="0">
+                  <a:rPr lang="en-US" sz="6000">
                     <a:solidFill>
                       <a:schemeClr val="tx1"/>
                     </a:solidFill>
                   </a:rPr>
-                  <a:t>. </a:t>
+                  <a:t>mulch residue. </a:t>
                 </a:r>
+                <a:endParaRPr lang="en-US" sz="6000" dirty="0">
+                  <a:solidFill>
+                    <a:schemeClr val="tx1"/>
+                  </a:solidFill>
+                </a:endParaRPr>
               </a:p>
               <a:p>
                 <a:pPr marL="857250" indent="-857250">
@@ -3816,7 +3829,7 @@
               <a:blipFill>
                 <a:blip r:embed="rId4"/>
                 <a:stretch>
-                  <a:fillRect l="-1292" t="-1630" r="-1962" b="-1087"/>
+                  <a:fillRect l="-1292" t="-1630" r="-1770" b="-1087"/>
                 </a:stretch>
               </a:blipFill>
             </p:spPr>

</xml_diff>